<commit_message>
Branch Name Format changed in git workflow
</commit_message>
<xml_diff>
--- a/Power Point Presentations/Git Workflow In Ppt.pptx
+++ b/Power Point Presentations/Git Workflow In Ppt.pptx
@@ -110,6 +110,11 @@
       </a:defRPr>
     </a:lvl9pPr>
   </p:defaultTextStyle>
+  <p:extLst>
+    <p:ext uri="{EFAFB233-063F-42B5-8137-9DF3F51BA10A}">
+      <p15:sldGuideLst xmlns:p15="http://schemas.microsoft.com/office/powerpoint/2012/main"/>
+    </p:ext>
+  </p:extLst>
 </p:presentation>
 </file>
 
@@ -3239,8 +3244,8 @@
               <a:t>Then checkout out to your own branch. </a:t>
             </a:r>
             <a:r>
-              <a:rPr lang="en-US" dirty="0" err="1" smtClean="0"/>
-              <a:t>Command:</a:t>
+              <a:rPr lang="en-US" dirty="0" smtClean="0"/>
+              <a:t>Command: </a:t>
             </a:r>
             <a:r>
               <a:rPr lang="en-US" dirty="0" err="1" smtClean="0">
@@ -3256,7 +3261,15 @@
                   <a:srgbClr val="FF0000"/>
                 </a:solidFill>
               </a:rPr>
-              <a:t> checkout </a:t>
+              <a:t> </a:t>
+            </a:r>
+            <a:r>
+              <a:rPr lang="en-US" dirty="0" smtClean="0">
+                <a:solidFill>
+                  <a:srgbClr val="FF0000"/>
+                </a:solidFill>
+              </a:rPr>
+              <a:t>checkout </a:t>
             </a:r>
             <a:r>
               <a:rPr lang="en-US" dirty="0" err="1" smtClean="0">
@@ -3264,7 +3277,7 @@
                   <a:srgbClr val="FF0000"/>
                 </a:solidFill>
               </a:rPr>
-              <a:t>team_member_name_task_doing</a:t>
+              <a:t>team_member_name_week_number_task_doing</a:t>
             </a:r>
             <a:endParaRPr lang="en-US" dirty="0" smtClean="0"/>
           </a:p>

</xml_diff>